<commit_message>
add link of app in PPT
</commit_message>
<xml_diff>
--- a/Stellar_object_classification.pptx
+++ b/Stellar_object_classification.pptx
@@ -16299,6 +16299,48 @@
           </a:p>
         </p:txBody>
       </p:sp>
+      <p:sp>
+        <p:nvSpPr>
+          <p:cNvPr id="7" name="Rectangle 6">
+            <a:extLst>
+              <a:ext uri="{FF2B5EF4-FFF2-40B4-BE49-F238E27FC236}">
+                <a16:creationId xmlns:a16="http://schemas.microsoft.com/office/drawing/2014/main" id="{E5CD500E-F75F-BC18-637F-0658B2D30910}"/>
+              </a:ext>
+            </a:extLst>
+          </p:cNvPr>
+          <p:cNvSpPr/>
+          <p:nvPr/>
+        </p:nvSpPr>
+        <p:spPr>
+          <a:xfrm>
+            <a:off x="1527672" y="4512037"/>
+            <a:ext cx="6158994" cy="369332"/>
+          </a:xfrm>
+          <a:prstGeom prst="rect">
+            <a:avLst/>
+          </a:prstGeom>
+        </p:spPr>
+        <p:txBody>
+          <a:bodyPr wrap="none">
+            <a:spAutoFit/>
+          </a:bodyPr>
+          <a:lstStyle/>
+          <a:p>
+            <a:pPr marL="285750" indent="-285750">
+              <a:buFont typeface="Wingdings" panose="05000000000000000000" pitchFamily="2" charset="2"/>
+              <a:buChar char="§"/>
+            </a:pPr>
+            <a:r>
+              <a:rPr lang="en-US" dirty="0">
+                <a:solidFill>
+                  <a:schemeClr val="bg1"/>
+                </a:solidFill>
+              </a:rPr>
+              <a:t>https://stellerobjectclassification-milan-virash.streamlit.app/</a:t>
+            </a:r>
+          </a:p>
+        </p:txBody>
+      </p:sp>
     </p:spTree>
     <p:extLst>
       <p:ext uri="{BB962C8B-B14F-4D97-AF65-F5344CB8AC3E}">
@@ -16542,6 +16584,41 @@
                                   </p:childTnLst>
                                 </p:cTn>
                               </p:par>
+                              <p:par>
+                                <p:cTn id="23" presetID="14" presetClass="entr" presetSubtype="10" fill="hold" grpId="0" nodeType="withEffect">
+                                  <p:stCondLst>
+                                    <p:cond delay="0"/>
+                                  </p:stCondLst>
+                                  <p:childTnLst>
+                                    <p:set>
+                                      <p:cBhvr>
+                                        <p:cTn id="24" dur="1" fill="hold">
+                                          <p:stCondLst>
+                                            <p:cond delay="0"/>
+                                          </p:stCondLst>
+                                        </p:cTn>
+                                        <p:tgtEl>
+                                          <p:spTgt spid="7"/>
+                                        </p:tgtEl>
+                                        <p:attrNameLst>
+                                          <p:attrName>style.visibility</p:attrName>
+                                        </p:attrNameLst>
+                                      </p:cBhvr>
+                                      <p:to>
+                                        <p:strVal val="visible"/>
+                                      </p:to>
+                                    </p:set>
+                                    <p:animEffect transition="in" filter="randombar(horizontal)">
+                                      <p:cBhvr>
+                                        <p:cTn id="25" dur="500"/>
+                                        <p:tgtEl>
+                                          <p:spTgt spid="7"/>
+                                        </p:tgtEl>
+                                      </p:cBhvr>
+                                    </p:animEffect>
+                                  </p:childTnLst>
+                                </p:cTn>
+                              </p:par>
                             </p:childTnLst>
                           </p:cTn>
                         </p:par>
@@ -16576,6 +16653,7 @@
       <p:bldP spid="5" grpId="0"/>
       <p:bldP spid="6" grpId="0"/>
       <p:bldP spid="8" grpId="0"/>
+      <p:bldP spid="7" grpId="0"/>
     </p:bldLst>
   </p:timing>
 </p:sld>

</xml_diff>